<commit_message>
Completed. Hello my huckleberry friends!
</commit_message>
<xml_diff>
--- a/Poster/Poster.pptx
+++ b/Poster/Poster.pptx
@@ -5064,7 +5064,7 @@
               <a:graphicData uri="http://schemas.openxmlformats.org/presentationml/2006/ole">
                 <mc:AlternateContent xmlns:mc="http://schemas.openxmlformats.org/markup-compatibility/2006">
                   <mc:Choice xmlns:v="urn:schemas-microsoft-com:vml" Requires="v">
-                    <p:oleObj spid="_x0000_s1201" name="Image" r:id="rId8" imgW="1828440" imgH="1117440" progId="Photoshop.Image.13">
+                    <p:oleObj spid="_x0000_s1270" name="Image" r:id="rId8" imgW="1828440" imgH="1117440" progId="Photoshop.Image.13">
                       <p:embed/>
                     </p:oleObj>
                   </mc:Choice>
@@ -5121,7 +5121,7 @@
               <a:graphicData uri="http://schemas.openxmlformats.org/presentationml/2006/ole">
                 <mc:AlternateContent xmlns:mc="http://schemas.openxmlformats.org/markup-compatibility/2006">
                   <mc:Choice xmlns:v="urn:schemas-microsoft-com:vml" Requires="v">
-                    <p:oleObj spid="_x0000_s1202" name="Image" r:id="rId10" imgW="1828440" imgH="1117440" progId="Photoshop.Image.13">
+                    <p:oleObj spid="_x0000_s1271" name="Image" r:id="rId10" imgW="1828440" imgH="1117440" progId="Photoshop.Image.13">
                       <p:embed/>
                     </p:oleObj>
                   </mc:Choice>
@@ -6249,7 +6249,7 @@
             <a:graphicData uri="http://schemas.openxmlformats.org/presentationml/2006/ole">
               <mc:AlternateContent xmlns:mc="http://schemas.openxmlformats.org/markup-compatibility/2006">
                 <mc:Choice xmlns:v="urn:schemas-microsoft-com:vml" Requires="v">
-                  <p:oleObj spid="_x0000_s1203" name="Image" r:id="rId12" imgW="4571280" imgH="1688760" progId="Photoshop.Image.13">
+                  <p:oleObj spid="_x0000_s1272" name="Image" r:id="rId12" imgW="4571280" imgH="1688760" progId="Photoshop.Image.13">
                     <p:embed/>
                   </p:oleObj>
                 </mc:Choice>
@@ -6333,7 +6333,7 @@
             <a:graphicData uri="http://schemas.openxmlformats.org/presentationml/2006/ole">
               <mc:AlternateContent xmlns:mc="http://schemas.openxmlformats.org/markup-compatibility/2006">
                 <mc:Choice xmlns:v="urn:schemas-microsoft-com:vml" Requires="v">
-                  <p:oleObj spid="_x0000_s1204" name="Image" r:id="rId15" imgW="1574280" imgH="1053720" progId="Photoshop.Image.13">
+                  <p:oleObj spid="_x0000_s1273" name="Image" r:id="rId15" imgW="1574280" imgH="1053720" progId="Photoshop.Image.13">
                     <p:embed/>
                   </p:oleObj>
                 </mc:Choice>
@@ -12420,7 +12420,7 @@
             <a:graphicData uri="http://schemas.openxmlformats.org/presentationml/2006/ole">
               <mc:AlternateContent xmlns:mc="http://schemas.openxmlformats.org/markup-compatibility/2006">
                 <mc:Choice xmlns:v="urn:schemas-microsoft-com:vml" Requires="v">
-                  <p:oleObj spid="_x0000_s2209" name="Image" r:id="rId4" imgW="4571280" imgH="1688760" progId="Photoshop.Image.13">
+                  <p:oleObj spid="_x0000_s2278" name="Image" r:id="rId4" imgW="4571280" imgH="1688760" progId="Photoshop.Image.13">
                     <p:embed/>
                   </p:oleObj>
                 </mc:Choice>
@@ -12504,7 +12504,7 @@
             <a:graphicData uri="http://schemas.openxmlformats.org/presentationml/2006/ole">
               <mc:AlternateContent xmlns:mc="http://schemas.openxmlformats.org/markup-compatibility/2006">
                 <mc:Choice xmlns:v="urn:schemas-microsoft-com:vml" Requires="v">
-                  <p:oleObj spid="_x0000_s2210" name="Image" r:id="rId7" imgW="1574280" imgH="1053720" progId="Photoshop.Image.13">
+                  <p:oleObj spid="_x0000_s2279" name="Image" r:id="rId7" imgW="1574280" imgH="1053720" progId="Photoshop.Image.13">
                     <p:embed/>
                   </p:oleObj>
                 </mc:Choice>
@@ -14044,7 +14044,7 @@
               <a:graphicData uri="http://schemas.openxmlformats.org/presentationml/2006/ole">
                 <mc:AlternateContent xmlns:mc="http://schemas.openxmlformats.org/markup-compatibility/2006">
                   <mc:Choice xmlns:v="urn:schemas-microsoft-com:vml" Requires="v">
-                    <p:oleObj spid="_x0000_s2211" name="Image" r:id="rId15" imgW="1828440" imgH="1117440" progId="Photoshop.Image.13">
+                    <p:oleObj spid="_x0000_s2280" name="Image" r:id="rId15" imgW="1828440" imgH="1117440" progId="Photoshop.Image.13">
                       <p:embed/>
                     </p:oleObj>
                   </mc:Choice>
@@ -14101,7 +14101,7 @@
               <a:graphicData uri="http://schemas.openxmlformats.org/presentationml/2006/ole">
                 <mc:AlternateContent xmlns:mc="http://schemas.openxmlformats.org/markup-compatibility/2006">
                   <mc:Choice xmlns:v="urn:schemas-microsoft-com:vml" Requires="v">
-                    <p:oleObj spid="_x0000_s2212" name="Image" r:id="rId17" imgW="1828440" imgH="1117440" progId="Photoshop.Image.13">
+                    <p:oleObj spid="_x0000_s2281" name="Image" r:id="rId17" imgW="1828440" imgH="1117440" progId="Photoshop.Image.13">
                       <p:embed/>
                     </p:oleObj>
                   </mc:Choice>
@@ -20063,7 +20063,7 @@
             <a:graphicData uri="http://schemas.openxmlformats.org/presentationml/2006/ole">
               <mc:AlternateContent xmlns:mc="http://schemas.openxmlformats.org/markup-compatibility/2006">
                 <mc:Choice xmlns:v="urn:schemas-microsoft-com:vml" Requires="v">
-                  <p:oleObj spid="_x0000_s3229" name="Image" r:id="rId4" imgW="4571280" imgH="1688760" progId="Photoshop.Image.13">
+                  <p:oleObj spid="_x0000_s3298" name="Image" r:id="rId4" imgW="4571280" imgH="1688760" progId="Photoshop.Image.13">
                     <p:embed/>
                   </p:oleObj>
                 </mc:Choice>
@@ -20147,7 +20147,7 @@
             <a:graphicData uri="http://schemas.openxmlformats.org/presentationml/2006/ole">
               <mc:AlternateContent xmlns:mc="http://schemas.openxmlformats.org/markup-compatibility/2006">
                 <mc:Choice xmlns:v="urn:schemas-microsoft-com:vml" Requires="v">
-                  <p:oleObj spid="_x0000_s3230" name="Image" r:id="rId7" imgW="1574280" imgH="1053720" progId="Photoshop.Image.13">
+                  <p:oleObj spid="_x0000_s3299" name="Image" r:id="rId7" imgW="1574280" imgH="1053720" progId="Photoshop.Image.13">
                     <p:embed/>
                   </p:oleObj>
                 </mc:Choice>
@@ -21687,7 +21687,7 @@
               <a:graphicData uri="http://schemas.openxmlformats.org/presentationml/2006/ole">
                 <mc:AlternateContent xmlns:mc="http://schemas.openxmlformats.org/markup-compatibility/2006">
                   <mc:Choice xmlns:v="urn:schemas-microsoft-com:vml" Requires="v">
-                    <p:oleObj spid="_x0000_s3231" name="Image" r:id="rId15" imgW="1828440" imgH="1117440" progId="Photoshop.Image.13">
+                    <p:oleObj spid="_x0000_s3300" name="Image" r:id="rId15" imgW="1828440" imgH="1117440" progId="Photoshop.Image.13">
                       <p:embed/>
                     </p:oleObj>
                   </mc:Choice>
@@ -21744,7 +21744,7 @@
               <a:graphicData uri="http://schemas.openxmlformats.org/presentationml/2006/ole">
                 <mc:AlternateContent xmlns:mc="http://schemas.openxmlformats.org/markup-compatibility/2006">
                   <mc:Choice xmlns:v="urn:schemas-microsoft-com:vml" Requires="v">
-                    <p:oleObj spid="_x0000_s3232" name="Image" r:id="rId17" imgW="1828440" imgH="1117440" progId="Photoshop.Image.13">
+                    <p:oleObj spid="_x0000_s3301" name="Image" r:id="rId17" imgW="1828440" imgH="1117440" progId="Photoshop.Image.13">
                       <p:embed/>
                     </p:oleObj>
                   </mc:Choice>
@@ -26722,7 +26722,7 @@
         <p:spPr>
           <a:xfrm>
             <a:off x="459674" y="5503831"/>
-            <a:ext cx="10056813" cy="6617174"/>
+            <a:ext cx="10056813" cy="7001895"/>
           </a:xfrm>
         </p:spPr>
         <p:txBody>
@@ -26731,114 +26731,170 @@
           <a:p>
             <a:pPr algn="just"/>
             <a:r>
-              <a:rPr lang="en-US" dirty="0"/>
+              <a:rPr lang="en-US" dirty="0">
+                <a:latin typeface="+mn-lt"/>
+              </a:rPr>
               <a:t>“</a:t>
             </a:r>
             <a:r>
-              <a:rPr lang="en-US" dirty="0" err="1"/>
+              <a:rPr lang="en-US" dirty="0" err="1">
+                <a:latin typeface="+mn-lt"/>
+              </a:rPr>
               <a:t>Zao</a:t>
             </a:r>
             <a:r>
-              <a:rPr lang="en-US" dirty="0"/>
+              <a:rPr lang="en-US" dirty="0">
+                <a:latin typeface="+mn-lt"/>
+              </a:rPr>
               <a:t> </a:t>
             </a:r>
             <a:r>
-              <a:rPr lang="en-US" dirty="0" err="1"/>
+              <a:rPr lang="en-US" dirty="0" err="1">
+                <a:latin typeface="+mn-lt"/>
+              </a:rPr>
               <a:t>Lian</a:t>
             </a:r>
             <a:r>
-              <a:rPr lang="en-US" dirty="0"/>
+              <a:rPr lang="en-US" dirty="0">
+                <a:latin typeface="+mn-lt"/>
+              </a:rPr>
               <a:t>”(Chinese word: 早恋), Chinse term of puppy love, has been a unique taboo in </a:t>
             </a:r>
             <a:r>
-              <a:rPr lang="en-US" dirty="0" smtClean="0"/>
+              <a:rPr lang="en-US" dirty="0" smtClean="0">
+                <a:latin typeface="+mn-lt"/>
+              </a:rPr>
               <a:t>Socialist </a:t>
             </a:r>
             <a:r>
-              <a:rPr lang="en-US" dirty="0"/>
+              <a:rPr lang="en-US" dirty="0">
+                <a:latin typeface="+mn-lt"/>
+              </a:rPr>
               <a:t>China from 1950s to early 2000s. </a:t>
             </a:r>
             <a:r>
-              <a:rPr lang="en-US" dirty="0" smtClean="0"/>
+              <a:rPr lang="en-US" dirty="0" smtClean="0">
+                <a:latin typeface="+mn-lt"/>
+              </a:rPr>
               <a:t>“</a:t>
             </a:r>
             <a:r>
-              <a:rPr lang="en-US" dirty="0" err="1" smtClean="0"/>
+              <a:rPr lang="en-US" dirty="0" err="1" smtClean="0">
+                <a:latin typeface="+mn-lt"/>
+              </a:rPr>
               <a:t>Zao</a:t>
             </a:r>
             <a:r>
-              <a:rPr lang="en-US" dirty="0" smtClean="0"/>
+              <a:rPr lang="en-US" dirty="0" smtClean="0">
+                <a:latin typeface="+mn-lt"/>
+              </a:rPr>
               <a:t> </a:t>
             </a:r>
             <a:r>
-              <a:rPr lang="en-US" dirty="0" err="1" smtClean="0"/>
+              <a:rPr lang="en-US" dirty="0" err="1" smtClean="0">
+                <a:latin typeface="+mn-lt"/>
+              </a:rPr>
               <a:t>Lian</a:t>
             </a:r>
             <a:r>
-              <a:rPr lang="en-US" dirty="0" smtClean="0"/>
+              <a:rPr lang="en-US" dirty="0" smtClean="0">
+                <a:latin typeface="+mn-lt"/>
+              </a:rPr>
               <a:t>” is </a:t>
             </a:r>
             <a:r>
-              <a:rPr lang="en-US" dirty="0"/>
+              <a:rPr lang="en-US" dirty="0">
+                <a:latin typeface="+mn-lt"/>
+              </a:rPr>
               <a:t>most commonly defined as dating or having a love relationship before college. </a:t>
             </a:r>
             <a:r>
-              <a:rPr lang="en-US" dirty="0" smtClean="0"/>
+              <a:rPr lang="en-US" dirty="0" smtClean="0">
+                <a:latin typeface="+mn-lt"/>
+              </a:rPr>
               <a:t>Policy makers formulated punitive policies on school rules and issued strict censorships on films and </a:t>
             </a:r>
             <a:r>
-              <a:rPr lang="en-US" dirty="0" err="1" smtClean="0"/>
+              <a:rPr lang="en-US" dirty="0" err="1" smtClean="0">
+                <a:latin typeface="+mn-lt"/>
+              </a:rPr>
               <a:t>tv</a:t>
             </a:r>
             <a:r>
-              <a:rPr lang="en-US" dirty="0" smtClean="0"/>
+              <a:rPr lang="en-US" dirty="0" smtClean="0">
+                <a:latin typeface="+mn-lt"/>
+              </a:rPr>
               <a:t> series to prevent and suppress “</a:t>
             </a:r>
             <a:r>
-              <a:rPr lang="en-US" dirty="0" err="1" smtClean="0"/>
+              <a:rPr lang="en-US" dirty="0" err="1" smtClean="0">
+                <a:latin typeface="+mn-lt"/>
+              </a:rPr>
               <a:t>Zao</a:t>
             </a:r>
             <a:r>
-              <a:rPr lang="en-US" dirty="0" smtClean="0"/>
+              <a:rPr lang="en-US" dirty="0" smtClean="0">
+                <a:latin typeface="+mn-lt"/>
+              </a:rPr>
               <a:t> </a:t>
             </a:r>
             <a:r>
-              <a:rPr lang="en-US" dirty="0" err="1" smtClean="0"/>
+              <a:rPr lang="en-US" dirty="0" err="1" smtClean="0">
+                <a:latin typeface="+mn-lt"/>
+              </a:rPr>
               <a:t>Lian</a:t>
             </a:r>
             <a:r>
-              <a:rPr lang="en-US" dirty="0" smtClean="0"/>
+              <a:rPr lang="en-US" dirty="0" smtClean="0">
+                <a:latin typeface="+mn-lt"/>
+              </a:rPr>
               <a:t>”. In </a:t>
             </a:r>
             <a:r>
-              <a:rPr lang="en-US" dirty="0"/>
+              <a:rPr lang="en-US" dirty="0">
+                <a:latin typeface="+mn-lt"/>
+              </a:rPr>
               <a:t>recent years (since late 2000s), however, there is an increasing tolerance on puppy love in the Chinese society. </a:t>
             </a:r>
             <a:r>
-              <a:rPr lang="en-US" dirty="0" smtClean="0"/>
+              <a:rPr lang="en-US" dirty="0" smtClean="0">
+                <a:latin typeface="+mn-lt"/>
+              </a:rPr>
               <a:t>Middle school and high school students are holding hands on campus without worrying about being expelled; TV series with young lovers at school are streaming on major TV networks. Past literatures provided historical and structural explanations for the formation and the development of this taboo through qualitative analysis of documents and interviews, but few has addressed the reason why the Chinese society changes its attitude towards “</a:t>
             </a:r>
             <a:r>
-              <a:rPr lang="en-US" dirty="0" err="1" smtClean="0"/>
+              <a:rPr lang="en-US" dirty="0" err="1" smtClean="0">
+                <a:latin typeface="+mn-lt"/>
+              </a:rPr>
               <a:t>Zao</a:t>
             </a:r>
             <a:r>
-              <a:rPr lang="en-US" dirty="0" smtClean="0"/>
+              <a:rPr lang="en-US" dirty="0" smtClean="0">
+                <a:latin typeface="+mn-lt"/>
+              </a:rPr>
               <a:t> </a:t>
             </a:r>
             <a:r>
-              <a:rPr lang="en-US" dirty="0" err="1" smtClean="0"/>
+              <a:rPr lang="en-US" dirty="0" err="1" smtClean="0">
+                <a:latin typeface="+mn-lt"/>
+              </a:rPr>
               <a:t>Lian</a:t>
             </a:r>
             <a:r>
-              <a:rPr lang="en-US" dirty="0" smtClean="0"/>
-              <a:t>” in recent years using computational tools. </a:t>
+              <a:rPr lang="en-US" dirty="0" smtClean="0">
+                <a:latin typeface="+mn-lt"/>
+              </a:rPr>
+              <a:t>” in recent years using computational tools. This research uses computational tools and constructs statistical models to examine factors that are likely to cause this </a:t>
             </a:r>
             <a:r>
-              <a:rPr lang="en-US" b="1" dirty="0" smtClean="0"/>
-              <a:t>This research uses computational tools and constructs statistical models to examine factors that are likely to cause this change. </a:t>
+              <a:rPr lang="en-US" dirty="0" smtClean="0">
+                <a:latin typeface="+mn-lt"/>
+              </a:rPr>
+              <a:t>change and to provide functional explanations for the change. </a:t>
             </a:r>
-            <a:endParaRPr lang="en-US" b="1" dirty="0"/>
+            <a:endParaRPr lang="en-US" dirty="0">
+              <a:latin typeface="+mn-lt"/>
+            </a:endParaRPr>
           </a:p>
         </p:txBody>
       </p:sp>
@@ -26919,18 +26975,26 @@
           <a:p>
             <a:pPr algn="just"/>
             <a:r>
-              <a:rPr lang="en-US" dirty="0" smtClean="0"/>
+              <a:rPr lang="en-US" dirty="0" smtClean="0">
+                <a:latin typeface="+mn-lt"/>
+              </a:rPr>
               <a:t>I used Python to scrape film and TV information from </a:t>
             </a:r>
             <a:r>
-              <a:rPr lang="en-US" dirty="0" err="1" smtClean="0"/>
+              <a:rPr lang="en-US" dirty="0" err="1" smtClean="0">
+                <a:latin typeface="+mn-lt"/>
+              </a:rPr>
               <a:t>Douban</a:t>
             </a:r>
             <a:r>
-              <a:rPr lang="en-US" dirty="0" smtClean="0"/>
+              <a:rPr lang="en-US" dirty="0" smtClean="0">
+                <a:latin typeface="+mn-lt"/>
+              </a:rPr>
               <a:t>, a Chinese film and movie rating website. Films and TV series with the three tags “Mainland China”, “School”, and “Romance” are scraped and I created a time series of the annual number of films and TV series produced.  </a:t>
             </a:r>
-            <a:endParaRPr lang="en-US" dirty="0"/>
+            <a:endParaRPr lang="en-US" dirty="0">
+              <a:latin typeface="+mn-lt"/>
+            </a:endParaRPr>
           </a:p>
         </p:txBody>
       </p:sp>
@@ -27025,7 +27089,7 @@
         </p:nvSpPr>
         <p:spPr>
           <a:xfrm>
-            <a:off x="33422043" y="4674100"/>
+            <a:off x="33369530" y="15024534"/>
             <a:ext cx="10047018" cy="754045"/>
           </a:xfrm>
         </p:spPr>
@@ -27050,12 +27114,182 @@
             <p:ph type="body" sz="quarter" idx="26"/>
           </p:nvPr>
         </p:nvSpPr>
-        <p:spPr/>
+        <p:spPr>
+          <a:xfrm>
+            <a:off x="33422043" y="15709462"/>
+            <a:ext cx="10047018" cy="5847732"/>
+          </a:xfrm>
+        </p:spPr>
         <p:txBody>
           <a:bodyPr/>
           <a:lstStyle/>
           <a:p>
-            <a:endParaRPr lang="en-US"/>
+            <a:pPr algn="just"/>
+            <a:r>
+              <a:rPr lang="en-US" dirty="0" smtClean="0">
+                <a:latin typeface="+mn-lt"/>
+              </a:rPr>
+              <a:t>The Chinese society’s attitude towards </a:t>
+            </a:r>
+            <a:r>
+              <a:rPr lang="en-US" dirty="0" err="1" smtClean="0">
+                <a:latin typeface="+mn-lt"/>
+              </a:rPr>
+              <a:t>Zao</a:t>
+            </a:r>
+            <a:r>
+              <a:rPr lang="en-US" dirty="0" smtClean="0">
+                <a:latin typeface="+mn-lt"/>
+              </a:rPr>
+              <a:t> </a:t>
+            </a:r>
+            <a:r>
+              <a:rPr lang="en-US" dirty="0" err="1" smtClean="0">
+                <a:latin typeface="+mn-lt"/>
+              </a:rPr>
+              <a:t>Lian</a:t>
+            </a:r>
+            <a:r>
+              <a:rPr lang="en-US" dirty="0" smtClean="0">
+                <a:latin typeface="+mn-lt"/>
+              </a:rPr>
+              <a:t>, specifically, the number of films and TV series with </a:t>
+            </a:r>
+            <a:r>
+              <a:rPr lang="en-US" dirty="0" err="1" smtClean="0">
+                <a:latin typeface="+mn-lt"/>
+              </a:rPr>
+              <a:t>Zao</a:t>
+            </a:r>
+            <a:r>
+              <a:rPr lang="en-US" dirty="0" smtClean="0">
+                <a:latin typeface="+mn-lt"/>
+              </a:rPr>
+              <a:t> </a:t>
+            </a:r>
+            <a:r>
+              <a:rPr lang="en-US" dirty="0" err="1" smtClean="0">
+                <a:latin typeface="+mn-lt"/>
+              </a:rPr>
+              <a:t>Lian</a:t>
+            </a:r>
+            <a:r>
+              <a:rPr lang="en-US" dirty="0" smtClean="0">
+                <a:latin typeface="+mn-lt"/>
+              </a:rPr>
+              <a:t> component in previous years, can be used predict China’s Fertility Rate and the average female’s age of first marriage, </a:t>
+            </a:r>
+            <a:r>
+              <a:rPr lang="en-US" dirty="0">
+                <a:latin typeface="+mn-lt"/>
+              </a:rPr>
+              <a:t>c</a:t>
+            </a:r>
+            <a:r>
+              <a:rPr lang="en-US" dirty="0" smtClean="0">
+                <a:latin typeface="+mn-lt"/>
+              </a:rPr>
+              <a:t>ontrary to the hypothesis that TFR and the average female’s age of first marriage have causal effects on the change in the attitude towards </a:t>
+            </a:r>
+            <a:r>
+              <a:rPr lang="en-US" dirty="0" err="1" smtClean="0">
+                <a:latin typeface="+mn-lt"/>
+              </a:rPr>
+              <a:t>Zao</a:t>
+            </a:r>
+            <a:r>
+              <a:rPr lang="en-US" dirty="0" smtClean="0">
+                <a:latin typeface="+mn-lt"/>
+              </a:rPr>
+              <a:t> </a:t>
+            </a:r>
+            <a:r>
+              <a:rPr lang="en-US" dirty="0" err="1" smtClean="0">
+                <a:latin typeface="+mn-lt"/>
+              </a:rPr>
+              <a:t>Lian</a:t>
+            </a:r>
+            <a:r>
+              <a:rPr lang="en-US" dirty="0" smtClean="0">
+                <a:latin typeface="+mn-lt"/>
+              </a:rPr>
+              <a:t>. However, a change in number of students studying abroad has a positive causal effect on the attitude towards </a:t>
+            </a:r>
+            <a:r>
+              <a:rPr lang="en-US" dirty="0" err="1" smtClean="0">
+                <a:latin typeface="+mn-lt"/>
+              </a:rPr>
+              <a:t>Zao</a:t>
+            </a:r>
+            <a:r>
+              <a:rPr lang="en-US" dirty="0" smtClean="0">
+                <a:latin typeface="+mn-lt"/>
+              </a:rPr>
+              <a:t> </a:t>
+            </a:r>
+            <a:r>
+              <a:rPr lang="en-US" dirty="0" err="1" smtClean="0">
+                <a:latin typeface="+mn-lt"/>
+              </a:rPr>
+              <a:t>Lian</a:t>
+            </a:r>
+            <a:r>
+              <a:rPr lang="en-US" dirty="0" smtClean="0">
+                <a:latin typeface="+mn-lt"/>
+              </a:rPr>
+              <a:t>. Policy makers are adjusting the society’s perception on </a:t>
+            </a:r>
+            <a:r>
+              <a:rPr lang="en-US" dirty="0" err="1" smtClean="0">
+                <a:latin typeface="+mn-lt"/>
+              </a:rPr>
+              <a:t>Zao</a:t>
+            </a:r>
+            <a:r>
+              <a:rPr lang="en-US" dirty="0" smtClean="0">
+                <a:latin typeface="+mn-lt"/>
+              </a:rPr>
+              <a:t> </a:t>
+            </a:r>
+            <a:r>
+              <a:rPr lang="en-US" dirty="0" err="1" smtClean="0">
+                <a:latin typeface="+mn-lt"/>
+              </a:rPr>
+              <a:t>Lian</a:t>
+            </a:r>
+            <a:r>
+              <a:rPr lang="en-US" dirty="0" smtClean="0">
+                <a:latin typeface="+mn-lt"/>
+              </a:rPr>
+              <a:t> in order to facilitate new marriage and fertility policies, because average marriage age has been postponing and TFR has been low. On the other hand, an increasing number of Chinese students studying abroad demonstrates diversifying forms of education in China. As ways to obtain high-quality higher education are no longer solely score-based, the purpose to reduce the negative effect of </a:t>
+            </a:r>
+            <a:r>
+              <a:rPr lang="en-US" dirty="0" err="1" smtClean="0">
+                <a:latin typeface="+mn-lt"/>
+              </a:rPr>
+              <a:t>Zao</a:t>
+            </a:r>
+            <a:r>
+              <a:rPr lang="en-US" dirty="0" smtClean="0">
+                <a:latin typeface="+mn-lt"/>
+              </a:rPr>
+              <a:t> </a:t>
+            </a:r>
+            <a:r>
+              <a:rPr lang="en-US" dirty="0" err="1" smtClean="0">
+                <a:latin typeface="+mn-lt"/>
+              </a:rPr>
+              <a:t>Lian</a:t>
+            </a:r>
+            <a:r>
+              <a:rPr lang="en-US" dirty="0" smtClean="0">
+                <a:latin typeface="+mn-lt"/>
+              </a:rPr>
+              <a:t> on exam results becomes less significant. </a:t>
+            </a:r>
+            <a:endParaRPr lang="en-US" dirty="0">
+              <a:latin typeface="+mn-lt"/>
+            </a:endParaRPr>
           </a:p>
         </p:txBody>
       </p:sp>
@@ -27069,12 +27303,21 @@
             <p:ph type="body" sz="quarter" idx="27"/>
           </p:nvPr>
         </p:nvSpPr>
-        <p:spPr/>
+        <p:spPr>
+          <a:xfrm>
+            <a:off x="33422043" y="21634157"/>
+            <a:ext cx="10047018" cy="754045"/>
+          </a:xfrm>
+        </p:spPr>
         <p:txBody>
           <a:bodyPr/>
           <a:lstStyle/>
           <a:p>
-            <a:endParaRPr lang="en-US"/>
+            <a:r>
+              <a:rPr lang="en-US" dirty="0" smtClean="0"/>
+              <a:t>REFERENCES</a:t>
+            </a:r>
+            <a:endParaRPr lang="en-US" dirty="0"/>
           </a:p>
         </p:txBody>
       </p:sp>
@@ -27088,12 +27331,190 @@
             <p:ph type="body" sz="quarter" idx="28"/>
           </p:nvPr>
         </p:nvSpPr>
-        <p:spPr/>
+        <p:spPr>
+          <a:xfrm>
+            <a:off x="33369530" y="22597586"/>
+            <a:ext cx="10052050" cy="5643747"/>
+          </a:xfrm>
+        </p:spPr>
         <p:txBody>
           <a:bodyPr/>
           <a:lstStyle/>
           <a:p>
-            <a:endParaRPr lang="en-US"/>
+            <a:pPr marL="342900" indent="-342900">
+              <a:buFont typeface="Arial" charset="0"/>
+              <a:buChar char="•"/>
+            </a:pPr>
+            <a:r>
+              <a:rPr lang="en-US" dirty="0">
+                <a:latin typeface="+mn-lt"/>
+              </a:rPr>
+              <a:t>Diebold, F.X. (2015), Forecasting, Department of Economics, University of </a:t>
+            </a:r>
+            <a:r>
+              <a:rPr lang="en-US" dirty="0" err="1">
+                <a:latin typeface="+mn-lt"/>
+              </a:rPr>
+              <a:t>Pennsyl</a:t>
+            </a:r>
+            <a:r>
+              <a:rPr lang="en-US" dirty="0">
+                <a:latin typeface="+mn-lt"/>
+              </a:rPr>
+              <a:t>- </a:t>
+            </a:r>
+            <a:r>
+              <a:rPr lang="en-US" dirty="0" err="1">
+                <a:latin typeface="+mn-lt"/>
+              </a:rPr>
+              <a:t>vania</a:t>
+            </a:r>
+            <a:r>
+              <a:rPr lang="en-US" dirty="0">
+                <a:latin typeface="+mn-lt"/>
+              </a:rPr>
+              <a:t>, http://</a:t>
+            </a:r>
+            <a:r>
+              <a:rPr lang="en-US" dirty="0" err="1">
+                <a:latin typeface="+mn-lt"/>
+              </a:rPr>
+              <a:t>www.ssc.upenn.edu</a:t>
+            </a:r>
+            <a:r>
+              <a:rPr lang="en-US" dirty="0">
+                <a:latin typeface="+mn-lt"/>
+              </a:rPr>
+              <a:t>/~</a:t>
+            </a:r>
+            <a:r>
+              <a:rPr lang="en-US" dirty="0" err="1" smtClean="0">
+                <a:latin typeface="+mn-lt"/>
+              </a:rPr>
+              <a:t>fdiebold</a:t>
+            </a:r>
+            <a:r>
+              <a:rPr lang="en-US" dirty="0" smtClean="0">
+                <a:latin typeface="+mn-lt"/>
+              </a:rPr>
+              <a:t>/</a:t>
+            </a:r>
+            <a:r>
+              <a:rPr lang="en-US" dirty="0" err="1" smtClean="0">
+                <a:latin typeface="+mn-lt"/>
+              </a:rPr>
+              <a:t>Textbooks.html</a:t>
+            </a:r>
+            <a:endParaRPr lang="en-US" dirty="0" smtClean="0">
+              <a:latin typeface="+mn-lt"/>
+            </a:endParaRPr>
+          </a:p>
+          <a:p>
+            <a:pPr marL="342900" indent="-342900">
+              <a:buFont typeface="Arial" charset="0"/>
+              <a:buChar char="•"/>
+            </a:pPr>
+            <a:r>
+              <a:rPr lang="en-US" dirty="0">
+                <a:latin typeface="+mn-lt"/>
+              </a:rPr>
+              <a:t>Pan, S., Parish, W., &amp; Huang, Y. (2011). Love and Sex of Chinese Teenagers: A Random Sampling Based on Census of populations aged 14-17. Chinese Youth Studies, 12(7), 55</a:t>
+            </a:r>
+            <a:r>
+              <a:rPr lang="en-US" dirty="0" smtClean="0">
+                <a:latin typeface="+mn-lt"/>
+              </a:rPr>
+              <a:t>.</a:t>
+            </a:r>
+            <a:endParaRPr lang="en-US" dirty="0">
+              <a:latin typeface="+mn-lt"/>
+            </a:endParaRPr>
+          </a:p>
+          <a:p>
+            <a:pPr marL="342900" indent="-342900">
+              <a:buFont typeface="Arial" charset="0"/>
+              <a:buChar char="•"/>
+            </a:pPr>
+            <a:r>
+              <a:rPr lang="en-US" dirty="0" err="1" smtClean="0">
+                <a:latin typeface="+mn-lt"/>
+              </a:rPr>
+              <a:t>Salganik</a:t>
+            </a:r>
+            <a:r>
+              <a:rPr lang="en-US" dirty="0">
+                <a:latin typeface="+mn-lt"/>
+              </a:rPr>
+              <a:t>, Matthew J. 2017. Bit by Bit: Social Research in the Digital Age. Princeton, NJ: Princeton University Press. Open review edition. </a:t>
+            </a:r>
+          </a:p>
+          <a:p>
+            <a:pPr marL="342900" indent="-342900">
+              <a:buFont typeface="Arial" charset="0"/>
+              <a:buChar char="•"/>
+            </a:pPr>
+            <a:r>
+              <a:rPr lang="en-US" dirty="0" smtClean="0">
+                <a:latin typeface="+mn-lt"/>
+              </a:rPr>
+              <a:t>Shen</a:t>
+            </a:r>
+            <a:r>
+              <a:rPr lang="en-US" dirty="0">
+                <a:latin typeface="+mn-lt"/>
+              </a:rPr>
+              <a:t>, Y. (2015). Too young to date! The origins of </a:t>
+            </a:r>
+            <a:r>
+              <a:rPr lang="en-US" dirty="0" err="1">
+                <a:latin typeface="+mn-lt"/>
+              </a:rPr>
+              <a:t>zaolian</a:t>
+            </a:r>
+            <a:r>
+              <a:rPr lang="en-US" dirty="0">
+                <a:latin typeface="+mn-lt"/>
+              </a:rPr>
+              <a:t> (early love) as a social problem in 20th- century China. History of Science, 53(1), 86</a:t>
+            </a:r>
+            <a:r>
+              <a:rPr lang="en-US" dirty="0" smtClean="0">
+                <a:latin typeface="+mn-lt"/>
+              </a:rPr>
+              <a:t>.</a:t>
+            </a:r>
+          </a:p>
+          <a:p>
+            <a:pPr marL="342900" indent="-342900">
+              <a:buFont typeface="Arial" charset="0"/>
+              <a:buChar char="•"/>
+            </a:pPr>
+            <a:r>
+              <a:rPr lang="en-US" dirty="0" err="1" smtClean="0">
+                <a:latin typeface="+mn-lt"/>
+              </a:rPr>
+              <a:t>Wang,J</a:t>
+            </a:r>
+            <a:r>
+              <a:rPr lang="en-US" dirty="0" smtClean="0">
+                <a:latin typeface="+mn-lt"/>
+              </a:rPr>
+              <a:t>. (2013,August31).Puppy love no longer taboo [Electronic version].Shanghai Daily Zhang, E. (2005). Rethinking Sexual Repression in Maoist China: Ideology, Structure</a:t>
+            </a:r>
+            <a:br>
+              <a:rPr lang="en-US" dirty="0" smtClean="0">
+                <a:latin typeface="+mn-lt"/>
+              </a:rPr>
+            </a:br>
+            <a:r>
+              <a:rPr lang="en-US" dirty="0" smtClean="0">
+                <a:latin typeface="+mn-lt"/>
+              </a:rPr>
+              <a:t>and the Ownership of the Body. Body and Society, 11(3), 9. </a:t>
+            </a:r>
+          </a:p>
+          <a:p>
+            <a:endParaRPr lang="en-US" dirty="0"/>
           </a:p>
         </p:txBody>
       </p:sp>
@@ -27107,12 +27528,21 @@
             <p:ph type="body" sz="quarter" idx="29"/>
           </p:nvPr>
         </p:nvSpPr>
-        <p:spPr/>
+        <p:spPr>
+          <a:xfrm>
+            <a:off x="33414042" y="28452396"/>
+            <a:ext cx="10047018" cy="754045"/>
+          </a:xfrm>
+        </p:spPr>
         <p:txBody>
           <a:bodyPr/>
           <a:lstStyle/>
           <a:p>
-            <a:endParaRPr lang="en-US"/>
+            <a:r>
+              <a:rPr lang="en-US" dirty="0" smtClean="0"/>
+              <a:t>CONTACT INFORMATION</a:t>
+            </a:r>
+            <a:endParaRPr lang="en-US" dirty="0"/>
           </a:p>
         </p:txBody>
       </p:sp>
@@ -27126,12 +27556,73 @@
             <p:ph type="body" sz="quarter" idx="30"/>
           </p:nvPr>
         </p:nvSpPr>
-        <p:spPr/>
+        <p:spPr>
+          <a:xfrm>
+            <a:off x="33417011" y="28997825"/>
+            <a:ext cx="10052050" cy="2231358"/>
+          </a:xfrm>
+        </p:spPr>
         <p:txBody>
           <a:bodyPr/>
           <a:lstStyle/>
           <a:p>
-            <a:endParaRPr lang="en-US"/>
+            <a:r>
+              <a:rPr lang="en-US" dirty="0" smtClean="0">
+                <a:latin typeface="+mn-lt"/>
+              </a:rPr>
+              <a:t>Yilun Dai  </a:t>
+            </a:r>
+          </a:p>
+          <a:p>
+            <a:r>
+              <a:rPr lang="en-US" dirty="0" smtClean="0">
+                <a:latin typeface="+mn-lt"/>
+              </a:rPr>
+              <a:t>Social Sciences </a:t>
+            </a:r>
+            <a:r>
+              <a:rPr lang="en-US" dirty="0" smtClean="0">
+                <a:latin typeface="+mn-lt"/>
+              </a:rPr>
+              <a:t>Division, </a:t>
+            </a:r>
+            <a:endParaRPr lang="en-US" dirty="0" smtClean="0">
+              <a:latin typeface="+mn-lt"/>
+            </a:endParaRPr>
+          </a:p>
+          <a:p>
+            <a:r>
+              <a:rPr lang="en-US" dirty="0" smtClean="0">
+                <a:latin typeface="+mn-lt"/>
+              </a:rPr>
+              <a:t>The University of </a:t>
+            </a:r>
+            <a:r>
+              <a:rPr lang="en-US" dirty="0" smtClean="0">
+                <a:latin typeface="+mn-lt"/>
+              </a:rPr>
+              <a:t>Chicago</a:t>
+            </a:r>
+            <a:endParaRPr lang="en-US" dirty="0" smtClean="0">
+              <a:latin typeface="+mn-lt"/>
+            </a:endParaRPr>
+          </a:p>
+          <a:p>
+            <a:r>
+              <a:rPr lang="en-US" dirty="0" smtClean="0">
+                <a:latin typeface="+mn-lt"/>
+              </a:rPr>
+              <a:t>Email: </a:t>
+            </a:r>
+            <a:r>
+              <a:rPr lang="en-US" dirty="0" err="1" smtClean="0">
+                <a:latin typeface="+mn-lt"/>
+              </a:rPr>
+              <a:t>yilundai@uchicago.edu</a:t>
+            </a:r>
+            <a:endParaRPr lang="en-US" dirty="0">
+              <a:latin typeface="+mn-lt"/>
+            </a:endParaRPr>
           </a:p>
         </p:txBody>
       </p:sp>
@@ -27160,25 +27651,6 @@
               <a:t>Note: </a:t>
             </a:r>
             <a:endParaRPr lang="en-US" dirty="0"/>
-          </a:p>
-        </p:txBody>
-      </p:sp>
-      <p:sp>
-        <p:nvSpPr>
-          <p:cNvPr id="16" name="Text Placeholder 15"/>
-          <p:cNvSpPr>
-            <a:spLocks noGrp="1"/>
-          </p:cNvSpPr>
-          <p:nvPr>
-            <p:ph type="body" sz="quarter" idx="150"/>
-          </p:nvPr>
-        </p:nvSpPr>
-        <p:spPr/>
-        <p:txBody>
-          <a:bodyPr/>
-          <a:lstStyle/>
-          <a:p>
-            <a:endParaRPr lang="en-US"/>
           </a:p>
         </p:txBody>
       </p:sp>
@@ -27218,9 +27690,34 @@
         <p:spPr/>
         <p:txBody>
           <a:bodyPr>
-            <a:normAutofit fontScale="92500" lnSpcReduction="10000"/>
+            <a:normAutofit fontScale="62500" lnSpcReduction="20000"/>
           </a:bodyPr>
           <a:lstStyle/>
+          <a:p>
+            <a:r>
+              <a:rPr lang="en-US" dirty="0"/>
+              <a:t>WHY HAVE THE CHINESE BECOME MORE </a:t>
+            </a:r>
+            <a:r>
+              <a:rPr lang="en-US" dirty="0" smtClean="0"/>
+              <a:t>TOLERANT </a:t>
+            </a:r>
+            <a:r>
+              <a:rPr lang="en-US" dirty="0"/>
+              <a:t>ON </a:t>
+            </a:r>
+            <a:r>
+              <a:rPr lang="en-US" dirty="0" smtClean="0"/>
+              <a:t>ZAO LIAN</a:t>
+            </a:r>
+          </a:p>
+          <a:p>
+            <a:r>
+              <a:rPr lang="en-US" sz="6000" dirty="0" smtClean="0"/>
+              <a:t>A Functional Analysis</a:t>
+            </a:r>
+            <a:endParaRPr lang="en-US" sz="7700" dirty="0" smtClean="0"/>
+          </a:p>
           <a:p>
             <a:endParaRPr lang="en-US" dirty="0"/>
           </a:p>
@@ -27568,14 +28065,12 @@
           <a:p>
             <a:r>
               <a:rPr lang="en-US" sz="2500" dirty="0" smtClean="0">
-                <a:latin typeface="Times New Roman" charset="0"/>
                 <a:ea typeface="Times New Roman" charset="0"/>
                 <a:cs typeface="Times New Roman" charset="0"/>
               </a:rPr>
               <a:t>VAR(2) Model for TFR and the Number of Films and TV series</a:t>
             </a:r>
             <a:endParaRPr lang="en-US" sz="2500" dirty="0">
-              <a:latin typeface="Times New Roman" charset="0"/>
               <a:ea typeface="Times New Roman" charset="0"/>
               <a:cs typeface="Times New Roman" charset="0"/>
             </a:endParaRPr>
@@ -27606,14 +28101,12 @@
           <a:p>
             <a:r>
               <a:rPr lang="en-US" sz="2500" dirty="0" smtClean="0">
-                <a:latin typeface="Times New Roman" charset="0"/>
                 <a:ea typeface="Times New Roman" charset="0"/>
                 <a:cs typeface="Times New Roman" charset="0"/>
               </a:rPr>
               <a:t>VAR(3) Model for Female’s Average Age at First Marriage and the Number of TV series </a:t>
             </a:r>
             <a:endParaRPr lang="en-US" sz="2500" dirty="0">
-              <a:latin typeface="Times New Roman" charset="0"/>
               <a:ea typeface="Times New Roman" charset="0"/>
               <a:cs typeface="Times New Roman" charset="0"/>
             </a:endParaRPr>
@@ -27674,14 +28167,12 @@
           <a:p>
             <a:r>
               <a:rPr lang="en-US" sz="2500" dirty="0" smtClean="0">
-                <a:latin typeface="Times New Roman" charset="0"/>
                 <a:ea typeface="Times New Roman" charset="0"/>
                 <a:cs typeface="Times New Roman" charset="0"/>
               </a:rPr>
               <a:t>VAR(5) Model for Number of Students Studying Abroad (In 1,000) and the Number of TV series</a:t>
             </a:r>
             <a:endParaRPr lang="en-US" sz="2500" dirty="0">
-              <a:latin typeface="Times New Roman" charset="0"/>
               <a:ea typeface="Times New Roman" charset="0"/>
               <a:cs typeface="Times New Roman" charset="0"/>
             </a:endParaRPr>
@@ -27829,6 +28320,7 @@
           </a:bodyPr>
           <a:lstStyle/>
           <a:p>
+            <a:pPr algn="ctr"/>
             <a:r>
               <a:rPr lang="en-US" sz="2500" dirty="0" smtClean="0"/>
               <a:t>Response of TFR to Impulse from the number of films and </a:t>
@@ -27867,6 +28359,7 @@
           </a:bodyPr>
           <a:lstStyle/>
           <a:p>
+            <a:pPr algn="ctr"/>
             <a:r>
               <a:rPr lang="en-US" sz="2500" dirty="0" smtClean="0"/>
               <a:t>Response of Female’s average age at First Marriage to Impulse from the number of films and </a:t>
@@ -27934,6 +28427,7 @@
           </a:bodyPr>
           <a:lstStyle/>
           <a:p>
+            <a:pPr algn="ctr"/>
             <a:r>
               <a:rPr lang="en-US" sz="2500" dirty="0" smtClean="0"/>
               <a:t>Response of</a:t>
@@ -27987,6 +28481,317 @@
           </a:prstGeom>
         </p:spPr>
       </p:pic>
+      <p:sp>
+        <p:nvSpPr>
+          <p:cNvPr id="41" name="Text Placeholder 8"/>
+          <p:cNvSpPr txBox="1">
+            <a:spLocks/>
+          </p:cNvSpPr>
+          <p:nvPr/>
+        </p:nvSpPr>
+        <p:spPr>
+          <a:xfrm>
+            <a:off x="33168790" y="4710901"/>
+            <a:ext cx="10047018" cy="754045"/>
+          </a:xfrm>
+          <a:prstGeom prst="rect">
+            <a:avLst/>
+          </a:prstGeom>
+          <a:noFill/>
+        </p:spPr>
+        <p:txBody>
+          <a:bodyPr wrap="square" lIns="91436" tIns="91436" rIns="91436" bIns="91436" anchor="ctr" anchorCtr="0">
+            <a:spAutoFit/>
+          </a:bodyPr>
+          <a:lstStyle>
+            <a:lvl1pPr marL="0" indent="0" algn="ctr" defTabSz="4388900" rtl="0" eaLnBrk="1" latinLnBrk="0" hangingPunct="1">
+              <a:spcBef>
+                <a:spcPct val="20000"/>
+              </a:spcBef>
+              <a:buFont typeface="Arial" pitchFamily="34" charset="0"/>
+              <a:buNone/>
+              <a:defRPr sz="3700" b="1" u="sng" kern="1200" baseline="0">
+                <a:solidFill>
+                  <a:schemeClr val="tx1"/>
+                </a:solidFill>
+                <a:latin typeface="+mn-lt"/>
+                <a:ea typeface="+mn-ea"/>
+                <a:cs typeface="+mn-cs"/>
+              </a:defRPr>
+            </a:lvl1pPr>
+            <a:lvl2pPr marL="3565982" indent="-1371531" algn="l" defTabSz="4388900" rtl="0" eaLnBrk="1" latinLnBrk="0" hangingPunct="1">
+              <a:spcBef>
+                <a:spcPct val="20000"/>
+              </a:spcBef>
+              <a:buFont typeface="Arial" pitchFamily="34" charset="0"/>
+              <a:buChar char="–"/>
+              <a:defRPr sz="13500" kern="1200">
+                <a:solidFill>
+                  <a:schemeClr val="tx1"/>
+                </a:solidFill>
+                <a:latin typeface="+mn-lt"/>
+                <a:ea typeface="+mn-ea"/>
+                <a:cs typeface="+mn-cs"/>
+              </a:defRPr>
+            </a:lvl2pPr>
+            <a:lvl3pPr marL="5486126" indent="-1097226" algn="l" defTabSz="4388900" rtl="0" eaLnBrk="1" latinLnBrk="0" hangingPunct="1">
+              <a:spcBef>
+                <a:spcPct val="20000"/>
+              </a:spcBef>
+              <a:buFont typeface="Arial" pitchFamily="34" charset="0"/>
+              <a:buChar char="•"/>
+              <a:defRPr sz="11600" kern="1200">
+                <a:solidFill>
+                  <a:schemeClr val="tx1"/>
+                </a:solidFill>
+                <a:latin typeface="+mn-lt"/>
+                <a:ea typeface="+mn-ea"/>
+                <a:cs typeface="+mn-cs"/>
+              </a:defRPr>
+            </a:lvl3pPr>
+            <a:lvl4pPr marL="7680577" indent="-1097226" algn="l" defTabSz="4388900" rtl="0" eaLnBrk="1" latinLnBrk="0" hangingPunct="1">
+              <a:spcBef>
+                <a:spcPct val="20000"/>
+              </a:spcBef>
+              <a:buFont typeface="Arial" pitchFamily="34" charset="0"/>
+              <a:buChar char="–"/>
+              <a:defRPr sz="9600" kern="1200">
+                <a:solidFill>
+                  <a:schemeClr val="tx1"/>
+                </a:solidFill>
+                <a:latin typeface="+mn-lt"/>
+                <a:ea typeface="+mn-ea"/>
+                <a:cs typeface="+mn-cs"/>
+              </a:defRPr>
+            </a:lvl4pPr>
+            <a:lvl5pPr marL="9875026" indent="-1097226" algn="l" defTabSz="4388900" rtl="0" eaLnBrk="1" latinLnBrk="0" hangingPunct="1">
+              <a:spcBef>
+                <a:spcPct val="20000"/>
+              </a:spcBef>
+              <a:buFont typeface="Arial" pitchFamily="34" charset="0"/>
+              <a:buChar char="»"/>
+              <a:defRPr sz="9600" kern="1200">
+                <a:solidFill>
+                  <a:schemeClr val="tx1"/>
+                </a:solidFill>
+                <a:latin typeface="+mn-lt"/>
+                <a:ea typeface="+mn-ea"/>
+                <a:cs typeface="+mn-cs"/>
+              </a:defRPr>
+            </a:lvl5pPr>
+            <a:lvl6pPr marL="12069477" indent="-1097226" algn="l" defTabSz="4388900" rtl="0" eaLnBrk="1" latinLnBrk="0" hangingPunct="1">
+              <a:spcBef>
+                <a:spcPct val="20000"/>
+              </a:spcBef>
+              <a:buFont typeface="Arial" pitchFamily="34" charset="0"/>
+              <a:buChar char="•"/>
+              <a:defRPr sz="9600" kern="1200">
+                <a:solidFill>
+                  <a:schemeClr val="tx1"/>
+                </a:solidFill>
+                <a:latin typeface="+mn-lt"/>
+                <a:ea typeface="+mn-ea"/>
+                <a:cs typeface="+mn-cs"/>
+              </a:defRPr>
+            </a:lvl6pPr>
+            <a:lvl7pPr marL="14263926" indent="-1097226" algn="l" defTabSz="4388900" rtl="0" eaLnBrk="1" latinLnBrk="0" hangingPunct="1">
+              <a:spcBef>
+                <a:spcPct val="20000"/>
+              </a:spcBef>
+              <a:buFont typeface="Arial" pitchFamily="34" charset="0"/>
+              <a:buChar char="•"/>
+              <a:defRPr sz="9600" kern="1200">
+                <a:solidFill>
+                  <a:schemeClr val="tx1"/>
+                </a:solidFill>
+                <a:latin typeface="+mn-lt"/>
+                <a:ea typeface="+mn-ea"/>
+                <a:cs typeface="+mn-cs"/>
+              </a:defRPr>
+            </a:lvl7pPr>
+            <a:lvl8pPr marL="16458377" indent="-1097226" algn="l" defTabSz="4388900" rtl="0" eaLnBrk="1" latinLnBrk="0" hangingPunct="1">
+              <a:spcBef>
+                <a:spcPct val="20000"/>
+              </a:spcBef>
+              <a:buFont typeface="Arial" pitchFamily="34" charset="0"/>
+              <a:buChar char="•"/>
+              <a:defRPr sz="9600" kern="1200">
+                <a:solidFill>
+                  <a:schemeClr val="tx1"/>
+                </a:solidFill>
+                <a:latin typeface="+mn-lt"/>
+                <a:ea typeface="+mn-ea"/>
+                <a:cs typeface="+mn-cs"/>
+              </a:defRPr>
+            </a:lvl8pPr>
+            <a:lvl9pPr marL="18652827" indent="-1097226" algn="l" defTabSz="4388900" rtl="0" eaLnBrk="1" latinLnBrk="0" hangingPunct="1">
+              <a:spcBef>
+                <a:spcPct val="20000"/>
+              </a:spcBef>
+              <a:buFont typeface="Arial" pitchFamily="34" charset="0"/>
+              <a:buChar char="•"/>
+              <a:defRPr sz="9600" kern="1200">
+                <a:solidFill>
+                  <a:schemeClr val="tx1"/>
+                </a:solidFill>
+                <a:latin typeface="+mn-lt"/>
+                <a:ea typeface="+mn-ea"/>
+                <a:cs typeface="+mn-cs"/>
+              </a:defRPr>
+            </a:lvl9pPr>
+          </a:lstStyle>
+          <a:p>
+            <a:r>
+              <a:rPr lang="en-US" dirty="0" smtClean="0"/>
+              <a:t>Validation</a:t>
+            </a:r>
+          </a:p>
+        </p:txBody>
+      </p:sp>
+      <p:sp>
+        <p:nvSpPr>
+          <p:cNvPr id="43" name="TextBox 42"/>
+          <p:cNvSpPr txBox="1"/>
+          <p:nvPr/>
+        </p:nvSpPr>
+        <p:spPr>
+          <a:xfrm>
+            <a:off x="33369530" y="5594756"/>
+            <a:ext cx="9910566" cy="477054"/>
+          </a:xfrm>
+          <a:prstGeom prst="rect">
+            <a:avLst/>
+          </a:prstGeom>
+          <a:noFill/>
+        </p:spPr>
+        <p:txBody>
+          <a:bodyPr wrap="square" rtlCol="0">
+            <a:spAutoFit/>
+          </a:bodyPr>
+          <a:lstStyle/>
+          <a:p>
+            <a:r>
+              <a:rPr lang="en-US" sz="2500" dirty="0" smtClean="0"/>
+              <a:t>Residuals are stable, </a:t>
+            </a:r>
+            <a:r>
+              <a:rPr lang="en-US" sz="2500" dirty="0" err="1" smtClean="0"/>
+              <a:t>radom</a:t>
+            </a:r>
+            <a:r>
+              <a:rPr lang="en-US" sz="2500" dirty="0" smtClean="0"/>
+              <a:t>, and to not break in later steps. </a:t>
+            </a:r>
+            <a:endParaRPr lang="en-US" sz="2500" dirty="0"/>
+          </a:p>
+        </p:txBody>
+      </p:sp>
+      <p:pic>
+        <p:nvPicPr>
+          <p:cNvPr id="44" name="Picture 43"/>
+          <p:cNvPicPr>
+            <a:picLocks noChangeAspect="1"/>
+          </p:cNvPicPr>
+          <p:nvPr/>
+        </p:nvPicPr>
+        <p:blipFill rotWithShape="1">
+          <a:blip r:embed="rId14">
+            <a:extLst>
+              <a:ext uri="{28A0092B-C50C-407E-A947-70E740481C1C}">
+                <a14:useLocalDpi xmlns:a14="http://schemas.microsoft.com/office/drawing/2010/main" val="0"/>
+              </a:ext>
+            </a:extLst>
+          </a:blip>
+          <a:srcRect b="52938"/>
+          <a:stretch/>
+        </p:blipFill>
+        <p:spPr>
+          <a:xfrm>
+            <a:off x="34275871" y="6028406"/>
+            <a:ext cx="7475633" cy="2673596"/>
+          </a:xfrm>
+          <a:prstGeom prst="rect">
+            <a:avLst/>
+          </a:prstGeom>
+        </p:spPr>
+      </p:pic>
+      <p:pic>
+        <p:nvPicPr>
+          <p:cNvPr id="50" name="Picture 49"/>
+          <p:cNvPicPr>
+            <a:picLocks noChangeAspect="1"/>
+          </p:cNvPicPr>
+          <p:nvPr/>
+        </p:nvPicPr>
+        <p:blipFill rotWithShape="1">
+          <a:blip r:embed="rId15">
+            <a:extLst>
+              <a:ext uri="{28A0092B-C50C-407E-A947-70E740481C1C}">
+                <a14:useLocalDpi xmlns:a14="http://schemas.microsoft.com/office/drawing/2010/main" val="0"/>
+              </a:ext>
+            </a:extLst>
+          </a:blip>
+          <a:srcRect t="2109" b="51478"/>
+          <a:stretch/>
+        </p:blipFill>
+        <p:spPr>
+          <a:xfrm>
+            <a:off x="34275871" y="8976637"/>
+            <a:ext cx="7475633" cy="2855699"/>
+          </a:xfrm>
+          <a:prstGeom prst="rect">
+            <a:avLst/>
+          </a:prstGeom>
+        </p:spPr>
+      </p:pic>
+      <p:pic>
+        <p:nvPicPr>
+          <p:cNvPr id="25" name="Picture 24"/>
+          <p:cNvPicPr>
+            <a:picLocks noChangeAspect="1"/>
+          </p:cNvPicPr>
+          <p:nvPr/>
+        </p:nvPicPr>
+        <p:blipFill rotWithShape="1">
+          <a:blip r:embed="rId16">
+            <a:extLst>
+              <a:ext uri="{28A0092B-C50C-407E-A947-70E740481C1C}">
+                <a14:useLocalDpi xmlns:a14="http://schemas.microsoft.com/office/drawing/2010/main" val="0"/>
+              </a:ext>
+            </a:extLst>
+          </a:blip>
+          <a:srcRect t="2723" b="51156"/>
+          <a:stretch/>
+        </p:blipFill>
+        <p:spPr>
+          <a:xfrm>
+            <a:off x="34275870" y="11553243"/>
+            <a:ext cx="7475634" cy="3099721"/>
+          </a:xfrm>
+          <a:prstGeom prst="rect">
+            <a:avLst/>
+          </a:prstGeom>
+        </p:spPr>
+      </p:pic>
+      <p:sp>
+        <p:nvSpPr>
+          <p:cNvPr id="42" name="Text Placeholder 41"/>
+          <p:cNvSpPr>
+            <a:spLocks noGrp="1"/>
+          </p:cNvSpPr>
+          <p:nvPr>
+            <p:ph type="body" sz="quarter" idx="150"/>
+          </p:nvPr>
+        </p:nvSpPr>
+        <p:spPr/>
+        <p:txBody>
+          <a:bodyPr/>
+          <a:lstStyle/>
+          <a:p>
+            <a:endParaRPr lang="en-US" dirty="0"/>
+          </a:p>
+        </p:txBody>
+      </p:sp>
     </p:spTree>
     <p:extLst>
       <p:ext uri="{BB962C8B-B14F-4D97-AF65-F5344CB8AC3E}">

</xml_diff>